<commit_message>
Updated presentation with CICD process
</commit_message>
<xml_diff>
--- a/presentation slides/Aboss-Spam-Check-Demo-App-Presentation.pptx
+++ b/presentation slides/Aboss-Spam-Check-Demo-App-Presentation.pptx
@@ -9,7 +9,8 @@
     <p:sldId id="257" r:id="rId3"/>
     <p:sldId id="259" r:id="rId4"/>
     <p:sldId id="260" r:id="rId5"/>
-    <p:sldId id="261" r:id="rId6"/>
+    <p:sldId id="262" r:id="rId6"/>
+    <p:sldId id="261" r:id="rId7"/>
   </p:sldIdLst>
   <p:sldSz cx="12192000" cy="6858000"/>
   <p:notesSz cx="6858000" cy="9144000"/>
@@ -108,6 +109,11 @@
       </a:defRPr>
     </a:lvl9pPr>
   </p:defaultTextStyle>
+  <p:extLst>
+    <p:ext uri="{EFAFB233-063F-42B5-8137-9DF3F51BA10A}">
+      <p15:sldGuideLst xmlns:p15="http://schemas.microsoft.com/office/powerpoint/2012/main"/>
+    </p:ext>
+  </p:extLst>
 </p:presentation>
 </file>
 
@@ -242,7 +248,7 @@
           <a:p>
             <a:fld id="{51C61CB9-8D6E-4F33-9503-308582AD6E20}" type="datetimeFigureOut">
               <a:rPr lang="en-IN" smtClean="0"/>
-              <a:t>29-06-2025</a:t>
+              <a:t>30-06-2025</a:t>
             </a:fld>
             <a:endParaRPr lang="en-IN"/>
           </a:p>
@@ -412,7 +418,7 @@
           <a:p>
             <a:fld id="{51C61CB9-8D6E-4F33-9503-308582AD6E20}" type="datetimeFigureOut">
               <a:rPr lang="en-IN" smtClean="0"/>
-              <a:t>29-06-2025</a:t>
+              <a:t>30-06-2025</a:t>
             </a:fld>
             <a:endParaRPr lang="en-IN"/>
           </a:p>
@@ -592,7 +598,7 @@
           <a:p>
             <a:fld id="{51C61CB9-8D6E-4F33-9503-308582AD6E20}" type="datetimeFigureOut">
               <a:rPr lang="en-IN" smtClean="0"/>
-              <a:t>29-06-2025</a:t>
+              <a:t>30-06-2025</a:t>
             </a:fld>
             <a:endParaRPr lang="en-IN"/>
           </a:p>
@@ -762,7 +768,7 @@
           <a:p>
             <a:fld id="{51C61CB9-8D6E-4F33-9503-308582AD6E20}" type="datetimeFigureOut">
               <a:rPr lang="en-IN" smtClean="0"/>
-              <a:t>29-06-2025</a:t>
+              <a:t>30-06-2025</a:t>
             </a:fld>
             <a:endParaRPr lang="en-IN"/>
           </a:p>
@@ -1008,7 +1014,7 @@
           <a:p>
             <a:fld id="{51C61CB9-8D6E-4F33-9503-308582AD6E20}" type="datetimeFigureOut">
               <a:rPr lang="en-IN" smtClean="0"/>
-              <a:t>29-06-2025</a:t>
+              <a:t>30-06-2025</a:t>
             </a:fld>
             <a:endParaRPr lang="en-IN"/>
           </a:p>
@@ -1240,7 +1246,7 @@
           <a:p>
             <a:fld id="{51C61CB9-8D6E-4F33-9503-308582AD6E20}" type="datetimeFigureOut">
               <a:rPr lang="en-IN" smtClean="0"/>
-              <a:t>29-06-2025</a:t>
+              <a:t>30-06-2025</a:t>
             </a:fld>
             <a:endParaRPr lang="en-IN"/>
           </a:p>
@@ -1607,7 +1613,7 @@
           <a:p>
             <a:fld id="{51C61CB9-8D6E-4F33-9503-308582AD6E20}" type="datetimeFigureOut">
               <a:rPr lang="en-IN" smtClean="0"/>
-              <a:t>29-06-2025</a:t>
+              <a:t>30-06-2025</a:t>
             </a:fld>
             <a:endParaRPr lang="en-IN"/>
           </a:p>
@@ -1725,7 +1731,7 @@
           <a:p>
             <a:fld id="{51C61CB9-8D6E-4F33-9503-308582AD6E20}" type="datetimeFigureOut">
               <a:rPr lang="en-IN" smtClean="0"/>
-              <a:t>29-06-2025</a:t>
+              <a:t>30-06-2025</a:t>
             </a:fld>
             <a:endParaRPr lang="en-IN"/>
           </a:p>
@@ -1820,7 +1826,7 @@
           <a:p>
             <a:fld id="{51C61CB9-8D6E-4F33-9503-308582AD6E20}" type="datetimeFigureOut">
               <a:rPr lang="en-IN" smtClean="0"/>
-              <a:t>29-06-2025</a:t>
+              <a:t>30-06-2025</a:t>
             </a:fld>
             <a:endParaRPr lang="en-IN"/>
           </a:p>
@@ -2097,7 +2103,7 @@
           <a:p>
             <a:fld id="{51C61CB9-8D6E-4F33-9503-308582AD6E20}" type="datetimeFigureOut">
               <a:rPr lang="en-IN" smtClean="0"/>
-              <a:t>29-06-2025</a:t>
+              <a:t>30-06-2025</a:t>
             </a:fld>
             <a:endParaRPr lang="en-IN"/>
           </a:p>
@@ -2350,7 +2356,7 @@
           <a:p>
             <a:fld id="{51C61CB9-8D6E-4F33-9503-308582AD6E20}" type="datetimeFigureOut">
               <a:rPr lang="en-IN" smtClean="0"/>
-              <a:t>29-06-2025</a:t>
+              <a:t>30-06-2025</a:t>
             </a:fld>
             <a:endParaRPr lang="en-IN"/>
           </a:p>
@@ -2563,7 +2569,7 @@
           <a:p>
             <a:fld id="{51C61CB9-8D6E-4F33-9503-308582AD6E20}" type="datetimeFigureOut">
               <a:rPr lang="en-IN" smtClean="0"/>
-              <a:t>29-06-2025</a:t>
+              <a:t>30-06-2025</a:t>
             </a:fld>
             <a:endParaRPr lang="en-IN"/>
           </a:p>
@@ -3407,6 +3413,217 @@
           <a:p>
             <a:r>
               <a:rPr lang="en-IN" sz="2400" dirty="0" smtClean="0"/>
+              <a:t>Github Actions CICD</a:t>
+            </a:r>
+            <a:endParaRPr lang="en-IN" sz="2400" dirty="0"/>
+          </a:p>
+        </p:txBody>
+      </p:sp>
+      <p:pic>
+        <p:nvPicPr>
+          <p:cNvPr id="5" name="Picture 4"/>
+          <p:cNvPicPr>
+            <a:picLocks noChangeAspect="1"/>
+          </p:cNvPicPr>
+          <p:nvPr/>
+        </p:nvPicPr>
+        <p:blipFill>
+          <a:blip r:embed="rId2">
+            <a:extLst>
+              <a:ext uri="{28A0092B-C50C-407E-A947-70E740481C1C}">
+                <a14:useLocalDpi xmlns:a14="http://schemas.microsoft.com/office/drawing/2010/main" val="0"/>
+              </a:ext>
+            </a:extLst>
+          </a:blip>
+          <a:stretch>
+            <a:fillRect/>
+          </a:stretch>
+        </p:blipFill>
+        <p:spPr>
+          <a:xfrm>
+            <a:off x="0" y="3465203"/>
+            <a:ext cx="12192000" cy="3392797"/>
+          </a:xfrm>
+          <a:prstGeom prst="rect">
+            <a:avLst/>
+          </a:prstGeom>
+        </p:spPr>
+      </p:pic>
+      <p:sp>
+        <p:nvSpPr>
+          <p:cNvPr id="6" name="TextBox 5"/>
+          <p:cNvSpPr txBox="1"/>
+          <p:nvPr/>
+        </p:nvSpPr>
+        <p:spPr>
+          <a:xfrm>
+            <a:off x="365760" y="1476103"/>
+            <a:ext cx="11077303" cy="2031325"/>
+          </a:xfrm>
+          <a:prstGeom prst="rect">
+            <a:avLst/>
+          </a:prstGeom>
+          <a:noFill/>
+        </p:spPr>
+        <p:txBody>
+          <a:bodyPr wrap="square" rtlCol="0">
+            <a:spAutoFit/>
+          </a:bodyPr>
+          <a:lstStyle/>
+          <a:p>
+            <a:r>
+              <a:rPr lang="en-IN" dirty="0" smtClean="0"/>
+              <a:t>Divided the CICD process into 4 stages </a:t>
+            </a:r>
+            <a:r>
+              <a:rPr lang="en-IN" dirty="0" err="1" smtClean="0"/>
+              <a:t>viz</a:t>
+            </a:r>
+            <a:r>
+              <a:rPr lang="en-IN" dirty="0" smtClean="0"/>
+              <a:t>:</a:t>
+            </a:r>
+          </a:p>
+          <a:p>
+            <a:pPr marL="342900" indent="-342900">
+              <a:buAutoNum type="arabicPeriod"/>
+            </a:pPr>
+            <a:r>
+              <a:rPr lang="en-IN" dirty="0" err="1" smtClean="0"/>
+              <a:t>unit_test_module</a:t>
+            </a:r>
+            <a:r>
+              <a:rPr lang="en-IN" dirty="0" smtClean="0"/>
+              <a:t>: It verifies the python files utilized in this repository are tested and works accordingly</a:t>
+            </a:r>
+          </a:p>
+          <a:p>
+            <a:pPr marL="342900" indent="-342900">
+              <a:buAutoNum type="arabicPeriod"/>
+            </a:pPr>
+            <a:r>
+              <a:rPr lang="en-IN" dirty="0" smtClean="0"/>
+              <a:t>Docker-build-and-push: Generated </a:t>
+            </a:r>
+            <a:r>
+              <a:rPr lang="en-IN" dirty="0" err="1" smtClean="0"/>
+              <a:t>docker</a:t>
+            </a:r>
+            <a:r>
+              <a:rPr lang="en-IN" dirty="0" smtClean="0"/>
+              <a:t> file for the program using the </a:t>
+            </a:r>
+            <a:r>
+              <a:rPr lang="en-IN" dirty="0" err="1" smtClean="0"/>
+              <a:t>Dockerfile</a:t>
+            </a:r>
+            <a:r>
+              <a:rPr lang="en-IN" dirty="0" smtClean="0"/>
+              <a:t> and pushes it on the </a:t>
+            </a:r>
+            <a:r>
+              <a:rPr lang="en-IN" dirty="0" err="1" smtClean="0"/>
+              <a:t>Dockerhub</a:t>
+            </a:r>
+            <a:r>
+              <a:rPr lang="en-IN" dirty="0" smtClean="0"/>
+              <a:t> registry.</a:t>
+            </a:r>
+          </a:p>
+          <a:p>
+            <a:pPr marL="342900" indent="-342900">
+              <a:buAutoNum type="arabicPeriod"/>
+            </a:pPr>
+            <a:r>
+              <a:rPr lang="en-IN" dirty="0" smtClean="0"/>
+              <a:t>Deploy-k8s-with-helm: Using Helm automated the deployment, service, </a:t>
+            </a:r>
+            <a:r>
+              <a:rPr lang="en-IN" dirty="0" err="1" smtClean="0"/>
+              <a:t>ingresss</a:t>
+            </a:r>
+            <a:r>
+              <a:rPr lang="en-IN" dirty="0" smtClean="0"/>
+              <a:t> and certificate issuer configurations on EKS.</a:t>
+            </a:r>
+          </a:p>
+          <a:p>
+            <a:pPr marL="342900" indent="-342900">
+              <a:buAutoNum type="arabicPeriod"/>
+            </a:pPr>
+            <a:r>
+              <a:rPr lang="en-IN" dirty="0" smtClean="0"/>
+              <a:t>Test-deploy-success: Checks if the URL is up and working </a:t>
+            </a:r>
+            <a:r>
+              <a:rPr lang="en-IN" smtClean="0"/>
+              <a:t>as expected.</a:t>
+            </a:r>
+            <a:endParaRPr lang="en-IN" dirty="0"/>
+          </a:p>
+        </p:txBody>
+      </p:sp>
+    </p:spTree>
+    <p:extLst>
+      <p:ext uri="{BB962C8B-B14F-4D97-AF65-F5344CB8AC3E}">
+        <p14:creationId xmlns:p14="http://schemas.microsoft.com/office/powerpoint/2010/main" val="532867976"/>
+      </p:ext>
+    </p:extLst>
+  </p:cSld>
+  <p:clrMapOvr>
+    <a:masterClrMapping/>
+  </p:clrMapOvr>
+  <p:timing>
+    <p:tnLst>
+      <p:par>
+        <p:cTn id="1" dur="indefinite" restart="never" nodeType="tmRoot"/>
+      </p:par>
+    </p:tnLst>
+  </p:timing>
+</p:sld>
+</file>
+
+<file path=ppt/slides/slide5.xml><?xml version="1.0" encoding="utf-8"?>
+<p:sld xmlns:a="http://schemas.openxmlformats.org/drawingml/2006/main" xmlns:r="http://schemas.openxmlformats.org/officeDocument/2006/relationships" xmlns:p="http://schemas.openxmlformats.org/presentationml/2006/main">
+  <p:cSld>
+    <p:spTree>
+      <p:nvGrpSpPr>
+        <p:cNvPr id="1" name=""/>
+        <p:cNvGrpSpPr/>
+        <p:nvPr/>
+      </p:nvGrpSpPr>
+      <p:grpSpPr>
+        <a:xfrm>
+          <a:off x="0" y="0"/>
+          <a:ext cx="0" cy="0"/>
+          <a:chOff x="0" y="0"/>
+          <a:chExt cx="0" cy="0"/>
+        </a:xfrm>
+      </p:grpSpPr>
+      <p:sp>
+        <p:nvSpPr>
+          <p:cNvPr id="2" name="TextBox 1"/>
+          <p:cNvSpPr txBox="1"/>
+          <p:nvPr/>
+        </p:nvSpPr>
+        <p:spPr>
+          <a:xfrm>
+            <a:off x="4493623" y="757646"/>
+            <a:ext cx="3709851" cy="461665"/>
+          </a:xfrm>
+          <a:prstGeom prst="rect">
+            <a:avLst/>
+          </a:prstGeom>
+          <a:noFill/>
+        </p:spPr>
+        <p:txBody>
+          <a:bodyPr wrap="square" rtlCol="0">
+            <a:spAutoFit/>
+          </a:bodyPr>
+          <a:lstStyle/>
+          <a:p>
+            <a:r>
+              <a:rPr lang="en-IN" sz="2400" dirty="0" smtClean="0"/>
               <a:t>Observability</a:t>
             </a:r>
             <a:endParaRPr lang="en-IN" sz="2400" dirty="0"/>
@@ -3476,7 +3693,7 @@
     </p:spTree>
     <p:extLst>
       <p:ext uri="{BB962C8B-B14F-4D97-AF65-F5344CB8AC3E}">
-        <p14:creationId xmlns:p14="http://schemas.microsoft.com/office/powerpoint/2010/main" val="532867976"/>
+        <p14:creationId xmlns:p14="http://schemas.microsoft.com/office/powerpoint/2010/main" val="2528045948"/>
       </p:ext>
     </p:extLst>
   </p:cSld>
@@ -3493,7 +3710,7 @@
 </p:sld>
 </file>
 
-<file path=ppt/slides/slide5.xml><?xml version="1.0" encoding="utf-8"?>
+<file path=ppt/slides/slide6.xml><?xml version="1.0" encoding="utf-8"?>
 <p:sld xmlns:a="http://schemas.openxmlformats.org/drawingml/2006/main" xmlns:r="http://schemas.openxmlformats.org/officeDocument/2006/relationships" xmlns:p="http://schemas.openxmlformats.org/presentationml/2006/main">
   <p:cSld>
     <p:spTree>

</xml_diff>